<commit_message>
updated python slides cell policy
</commit_message>
<xml_diff>
--- a/print/lesson_73_python.pptx
+++ b/print/lesson_73_python.pptx
@@ -14,6 +14,7 @@
     <p:sldId id="259" r:id="rId11"/>
     <p:sldId id="260" r:id="rId12"/>
     <p:sldId id="261" r:id="rId13"/>
+    <p:sldId id="262" r:id="rId14"/>
   </p:sldIdLst>
   <p:sldSz cx="9144000" cy="5143500"/>
   <p:notesSz cx="6858000" cy="9144000"/>
@@ -8413,14 +8414,14 @@
       </p:sp>
       <p:sp>
         <p:nvSpPr>
-          <p:cNvPr id="234" name="Google Shape;119;p19"/>
+          <p:cNvPr id="234" name="a. Students will receive their phones at the end of 9th period and 10th period.…"/>
           <p:cNvSpPr txBox="1"/>
           <p:nvPr/>
         </p:nvSpPr>
         <p:spPr>
           <a:xfrm>
-            <a:off x="2463308" y="1404067"/>
-            <a:ext cx="10603771" cy="2452971"/>
+            <a:off x="2043641" y="1683954"/>
+            <a:ext cx="5514963" cy="2786107"/>
           </a:xfrm>
           <a:prstGeom prst="rect">
             <a:avLst/>
@@ -8435,76 +8436,44 @@
           </a:extLst>
         </p:spPr>
         <p:txBody>
-          <a:bodyPr lIns="243799" tIns="243799" rIns="243799" bIns="243799">
-            <a:normAutofit fontScale="100000" lnSpcReduction="0"/>
+          <a:bodyPr lIns="0" tIns="0" rIns="0" bIns="0">
+            <a:spAutoFit/>
           </a:bodyPr>
           <a:lstStyle/>
           <a:p>
-            <a:pPr marL="629708" indent="-629708" defTabSz="2438400">
-              <a:lnSpc>
-                <a:spcPct val="115000"/>
-              </a:lnSpc>
-              <a:buSzPct val="100000"/>
-              <a:buAutoNum type="arabicPeriod" startAt="1"/>
-              <a:defRPr sz="1800">
+            <a:pPr defTabSz="457200">
+              <a:defRPr sz="1900">
                 <a:solidFill>
-                  <a:srgbClr val="171717"/>
+                  <a:srgbClr val="222222"/>
                 </a:solidFill>
               </a:defRPr>
             </a:pPr>
             <a:r>
-              <a:t>Make sure there isn’t any litter near your workstation.</a:t>
-            </a:r>
-          </a:p>
-          <a:p>
-            <a:pPr marL="629708" indent="-629708" defTabSz="2438400">
-              <a:lnSpc>
-                <a:spcPct val="115000"/>
-              </a:lnSpc>
-              <a:buSzPct val="100000"/>
-              <a:buAutoNum type="arabicPeriod" startAt="1"/>
-              <a:defRPr sz="1800">
+              <a:t>a. Students will receive their phones at the end of 9th period and 10th period. </a:t>
+            </a:r>
+          </a:p>
+          <a:p>
+            <a:pPr defTabSz="457200">
+              <a:defRPr sz="1900">
                 <a:solidFill>
-                  <a:srgbClr val="171717"/>
+                  <a:srgbClr val="222222"/>
                 </a:solidFill>
               </a:defRPr>
             </a:pPr>
             <a:r>
-              <a:t>If you borrowed headphones, sign them back in.</a:t>
-            </a:r>
-          </a:p>
-          <a:p>
-            <a:pPr marL="629708" indent="-629708" defTabSz="2438400">
-              <a:lnSpc>
-                <a:spcPct val="115000"/>
-              </a:lnSpc>
-              <a:buSzPct val="100000"/>
-              <a:buAutoNum type="arabicPeriod" startAt="1"/>
-              <a:defRPr b="1" sz="1800">
+              <a:t>b. Students without a phone may leave class immediately. All other students should remain seated. Once a student collects their phone, they should exit the classroom.  </a:t>
+            </a:r>
+          </a:p>
+          <a:p>
+            <a:pPr defTabSz="457200">
+              <a:defRPr sz="1900">
                 <a:solidFill>
-                  <a:srgbClr val="171717"/>
+                  <a:srgbClr val="222222"/>
                 </a:solidFill>
               </a:defRPr>
             </a:pPr>
             <a:r>
-              <a:t>Make sure you are logged out of your computer! </a:t>
-            </a:r>
-          </a:p>
-          <a:p>
-            <a:pPr marL="629708" indent="-629708" defTabSz="2438400">
-              <a:lnSpc>
-                <a:spcPct val="115000"/>
-              </a:lnSpc>
-              <a:buSzPct val="100000"/>
-              <a:buAutoNum type="arabicPeriod" startAt="1"/>
-              <a:defRPr sz="1800">
-                <a:solidFill>
-                  <a:srgbClr val="171717"/>
-                </a:solidFill>
-              </a:defRPr>
-            </a:pPr>
-            <a:r>
-              <a:t>Remain in your seat until the bell rings.</a:t>
+              <a:t>c. Students must show their ID, program, or a notebook with their name on it to receive their phone. </a:t>
             </a:r>
           </a:p>
         </p:txBody>
@@ -8573,7 +8542,292 @@
         </p:sp>
         <p:sp>
           <p:nvSpPr>
-            <p:cNvPr id="236" name="wrapping up!…"/>
+            <p:cNvPr id="236" name="Cell phone distro…"/>
+            <p:cNvSpPr txBox="1"/>
+            <p:nvPr/>
+          </p:nvSpPr>
+          <p:spPr>
+            <a:xfrm>
+              <a:off x="12699" y="12699"/>
+              <a:ext cx="6509795" cy="785206"/>
+            </a:xfrm>
+            <a:prstGeom prst="rect">
+              <a:avLst/>
+            </a:prstGeom>
+            <a:noFill/>
+            <a:ln w="12700" cap="flat">
+              <a:noFill/>
+              <a:miter lim="400000"/>
+            </a:ln>
+            <a:effectLst/>
+            <a:extLst>
+              <a:ext uri="{C572A759-6A51-4108-AA02-DFA0A04FC94B}">
+                <ma14:wrappingTextBoxFlag xmlns:ma14="http://schemas.microsoft.com/office/mac/drawingml/2011/main" val="1"/>
+              </a:ext>
+            </a:extLst>
+          </p:spPr>
+          <p:txBody>
+            <a:bodyPr wrap="square" lIns="91422" tIns="91422" rIns="91422" bIns="91422" numCol="1" anchor="t">
+              <a:normAutofit fontScale="100000" lnSpcReduction="0"/>
+            </a:bodyPr>
+            <a:lstStyle/>
+            <a:p>
+              <a:pPr>
+                <a:defRPr sz="2400"/>
+              </a:pPr>
+              <a:r>
+                <a:t>Cell phone distro</a:t>
+              </a:r>
+            </a:p>
+            <a:p>
+              <a:pPr>
+                <a:defRPr>
+                  <a:solidFill>
+                    <a:schemeClr val="accent5"/>
+                  </a:solidFill>
+                  <a:latin typeface="+mn-lt"/>
+                  <a:ea typeface="+mn-ea"/>
+                  <a:cs typeface="+mn-cs"/>
+                  <a:sym typeface="Helvetica"/>
+                </a:defRPr>
+              </a:pPr>
+              <a:r>
+                <a:t>be sure to:</a:t>
+              </a:r>
+              <a:r>
+                <a:rPr>
+                  <a:solidFill>
+                    <a:schemeClr val="accent5">
+                      <a:lumOff val="-9843"/>
+                    </a:schemeClr>
+                  </a:solidFill>
+                </a:rPr>
+                <a:t> </a:t>
+              </a:r>
+              <a:r>
+                <a:rPr>
+                  <a:solidFill>
+                    <a:schemeClr val="accent1"/>
+                  </a:solidFill>
+                </a:rPr>
+                <a:t>Carefully read the directions below</a:t>
+              </a:r>
+            </a:p>
+          </p:txBody>
+        </p:sp>
+      </p:grpSp>
+    </p:spTree>
+  </p:cSld>
+  <p:clrMapOvr>
+    <a:masterClrMapping/>
+  </p:clrMapOvr>
+  <p:transition xmlns:p14="http://schemas.microsoft.com/office/powerpoint/2010/main" spd="med" advClick="1"/>
+</p:sld>
+</file>
+
+<file path=ppt/slides/slide7.xml><?xml version="1.0" encoding="utf-8"?>
+<p:sld xmlns:a="http://schemas.openxmlformats.org/drawingml/2006/main" xmlns:r="http://schemas.openxmlformats.org/officeDocument/2006/relationships" xmlns:p="http://schemas.openxmlformats.org/presentationml/2006/main" xmlns:m="http://schemas.openxmlformats.org/officeDocument/2006/math" xmlns:a14="http://schemas.microsoft.com/office/drawing/2010/main" showMasterSp="1" showMasterPhAnim="1">
+  <p:cSld>
+    <p:spTree>
+      <p:nvGrpSpPr>
+        <p:cNvPr id="1" name=""/>
+        <p:cNvGrpSpPr/>
+        <p:nvPr/>
+      </p:nvGrpSpPr>
+      <p:grpSpPr>
+        <a:xfrm>
+          <a:off x="0" y="0"/>
+          <a:ext cx="0" cy="0"/>
+          <a:chOff x="0" y="0"/>
+          <a:chExt cx="0" cy="0"/>
+        </a:xfrm>
+      </p:grpSpPr>
+      <p:sp>
+        <p:nvSpPr>
+          <p:cNvPr id="239" name="Double-click to edit"/>
+          <p:cNvSpPr txBox="1"/>
+          <p:nvPr>
+            <p:ph type="title"/>
+          </p:nvPr>
+        </p:nvSpPr>
+        <p:spPr>
+          <a:prstGeom prst="rect">
+            <a:avLst/>
+          </a:prstGeom>
+        </p:spPr>
+        <p:txBody>
+          <a:bodyPr/>
+          <a:lstStyle/>
+          <a:p>
+            <a:pPr defTabSz="886968">
+              <a:defRPr sz="2910"/>
+            </a:pPr>
+          </a:p>
+        </p:txBody>
+      </p:sp>
+      <p:sp>
+        <p:nvSpPr>
+          <p:cNvPr id="240" name="Google Shape;119;p19"/>
+          <p:cNvSpPr txBox="1"/>
+          <p:nvPr/>
+        </p:nvSpPr>
+        <p:spPr>
+          <a:xfrm>
+            <a:off x="2463308" y="1404067"/>
+            <a:ext cx="10603771" cy="2452971"/>
+          </a:xfrm>
+          <a:prstGeom prst="rect">
+            <a:avLst/>
+          </a:prstGeom>
+          <a:ln w="12700">
+            <a:miter lim="400000"/>
+          </a:ln>
+          <a:extLst>
+            <a:ext uri="{C572A759-6A51-4108-AA02-DFA0A04FC94B}">
+              <ma14:wrappingTextBoxFlag xmlns:ma14="http://schemas.microsoft.com/office/mac/drawingml/2011/main" val="1"/>
+            </a:ext>
+          </a:extLst>
+        </p:spPr>
+        <p:txBody>
+          <a:bodyPr lIns="243799" tIns="243799" rIns="243799" bIns="243799">
+            <a:normAutofit fontScale="100000" lnSpcReduction="0"/>
+          </a:bodyPr>
+          <a:lstStyle/>
+          <a:p>
+            <a:pPr marL="629708" indent="-629708" defTabSz="2438400">
+              <a:lnSpc>
+                <a:spcPct val="115000"/>
+              </a:lnSpc>
+              <a:buSzPct val="100000"/>
+              <a:buAutoNum type="arabicPeriod" startAt="1"/>
+              <a:defRPr sz="1800">
+                <a:solidFill>
+                  <a:srgbClr val="171717"/>
+                </a:solidFill>
+              </a:defRPr>
+            </a:pPr>
+            <a:r>
+              <a:t>Make sure there isn’t any litter near your workstation.</a:t>
+            </a:r>
+          </a:p>
+          <a:p>
+            <a:pPr marL="629708" indent="-629708" defTabSz="2438400">
+              <a:lnSpc>
+                <a:spcPct val="115000"/>
+              </a:lnSpc>
+              <a:buSzPct val="100000"/>
+              <a:buAutoNum type="arabicPeriod" startAt="1"/>
+              <a:defRPr sz="1800">
+                <a:solidFill>
+                  <a:srgbClr val="171717"/>
+                </a:solidFill>
+              </a:defRPr>
+            </a:pPr>
+            <a:r>
+              <a:t>If you borrowed headphones, sign them back in.</a:t>
+            </a:r>
+          </a:p>
+          <a:p>
+            <a:pPr marL="629708" indent="-629708" defTabSz="2438400">
+              <a:lnSpc>
+                <a:spcPct val="115000"/>
+              </a:lnSpc>
+              <a:buSzPct val="100000"/>
+              <a:buAutoNum type="arabicPeriod" startAt="1"/>
+              <a:defRPr b="1" sz="1800">
+                <a:solidFill>
+                  <a:srgbClr val="171717"/>
+                </a:solidFill>
+              </a:defRPr>
+            </a:pPr>
+            <a:r>
+              <a:t>Make sure you are logged out of your computer! </a:t>
+            </a:r>
+          </a:p>
+          <a:p>
+            <a:pPr marL="629708" indent="-629708" defTabSz="2438400">
+              <a:lnSpc>
+                <a:spcPct val="115000"/>
+              </a:lnSpc>
+              <a:buSzPct val="100000"/>
+              <a:buAutoNum type="arabicPeriod" startAt="1"/>
+              <a:defRPr sz="1800">
+                <a:solidFill>
+                  <a:srgbClr val="171717"/>
+                </a:solidFill>
+              </a:defRPr>
+            </a:pPr>
+            <a:r>
+              <a:t>Remain in your seat until the bell rings.</a:t>
+            </a:r>
+          </a:p>
+        </p:txBody>
+      </p:sp>
+      <p:grpSp>
+        <p:nvGrpSpPr>
+          <p:cNvPr id="243" name="Google Shape;118;p19"/>
+          <p:cNvGrpSpPr/>
+          <p:nvPr/>
+        </p:nvGrpSpPr>
+        <p:grpSpPr>
+          <a:xfrm>
+            <a:off x="2147095" y="500360"/>
+            <a:ext cx="6535195" cy="810605"/>
+            <a:chOff x="0" y="0"/>
+            <a:chExt cx="6535193" cy="810604"/>
+          </a:xfrm>
+        </p:grpSpPr>
+        <p:sp>
+          <p:nvSpPr>
+            <p:cNvPr id="241" name="Rectangle"/>
+            <p:cNvSpPr/>
+            <p:nvPr/>
+          </p:nvSpPr>
+          <p:spPr>
+            <a:xfrm>
+              <a:off x="-1" y="-1"/>
+              <a:ext cx="6535195" cy="810606"/>
+            </a:xfrm>
+            <a:prstGeom prst="rect">
+              <a:avLst/>
+            </a:prstGeom>
+            <a:solidFill>
+              <a:srgbClr val="FFFFFF"/>
+            </a:solidFill>
+            <a:ln w="25400" cap="flat">
+              <a:solidFill>
+                <a:schemeClr val="accent1"/>
+              </a:solidFill>
+              <a:prstDash val="solid"/>
+              <a:round/>
+            </a:ln>
+            <a:effectLst/>
+          </p:spPr>
+          <p:txBody>
+            <a:bodyPr wrap="square" lIns="0" tIns="0" rIns="0" bIns="0" numCol="1" anchor="t">
+              <a:noAutofit/>
+            </a:bodyPr>
+            <a:lstStyle/>
+            <a:p>
+              <a:pPr>
+                <a:defRPr>
+                  <a:solidFill>
+                    <a:schemeClr val="accent3">
+                      <a:lumOff val="-9098"/>
+                    </a:schemeClr>
+                  </a:solidFill>
+                  <a:latin typeface="+mn-lt"/>
+                  <a:ea typeface="+mn-ea"/>
+                  <a:cs typeface="+mn-cs"/>
+                  <a:sym typeface="Helvetica"/>
+                </a:defRPr>
+              </a:pPr>
+            </a:p>
+          </p:txBody>
+        </p:sp>
+        <p:sp>
+          <p:nvSpPr>
+            <p:cNvPr id="242" name="wrapping up!…"/>
             <p:cNvSpPr txBox="1"/>
             <p:nvPr/>
           </p:nvSpPr>
@@ -8649,7 +8903,7 @@
       </p:grpSp>
       <p:pic>
         <p:nvPicPr>
-          <p:cNvPr id="238" name="Image" descr="Image"/>
+          <p:cNvPr id="244" name="Image" descr="Image"/>
           <p:cNvPicPr>
             <a:picLocks noChangeAspect="1"/>
           </p:cNvPicPr>

</xml_diff>